<commit_message>
added heatmap on robustness
</commit_message>
<xml_diff>
--- a/plots/overall_new/figure_5_final_2.pptx
+++ b/plots/overall_new/figure_5_final_2.pptx
@@ -118,9 +118,7 @@
 <file path=ppt/revisionInfo.xml><?xml version="1.0" encoding="utf-8"?>
 <p1510:revInfo xmlns:a="http://schemas.openxmlformats.org/drawingml/2006/main" xmlns:r="http://schemas.openxmlformats.org/officeDocument/2006/relationships" xmlns:p1510="http://schemas.microsoft.com/office/powerpoint/2015/10/main">
   <p1510:revLst>
-    <p1510:client id="{96165B9D-EC67-3942-A76C-E087C2ADB9EB}" v="21" dt="2023-09-17T10:51:52.356"/>
-    <p1510:client id="{9796F13D-D801-E343-9E0B-5BD7512AF628}" v="2" dt="2023-09-17T11:51:12.037"/>
-    <p1510:client id="{9FF6FAE1-89A5-4A40-9875-89A9165BCC50}" v="1" dt="2023-09-17T11:54:04.137"/>
+    <p1510:client id="{7C04AEC6-2388-A444-8AD9-FEC97B542476}" v="13" dt="2023-11-08T10:17:21.600"/>
   </p1510:revLst>
 </p1510:revInfo>
 </file>
@@ -1004,26 +1002,130 @@
     </pc:docChg>
   </pc:docChgLst>
   <pc:docChgLst>
-    <pc:chgData name="Cecilia Trivellin" userId="77962b75-de7c-4c40-bb6b-4b915835e2f5" providerId="ADAL" clId="{50578758-FB8E-1D46-933B-BCB98BFCC5BC}"/>
+    <pc:chgData name="Cecilia Trivellin" userId="77962b75-de7c-4c40-bb6b-4b915835e2f5" providerId="ADAL" clId="{7C04AEC6-2388-A444-8AD9-FEC97B542476}"/>
     <pc:docChg chg="modSld">
-      <pc:chgData name="Cecilia Trivellin" userId="77962b75-de7c-4c40-bb6b-4b915835e2f5" providerId="ADAL" clId="{50578758-FB8E-1D46-933B-BCB98BFCC5BC}" dt="2023-09-17T11:52:25.860" v="0" actId="1076"/>
+      <pc:chgData name="Cecilia Trivellin" userId="77962b75-de7c-4c40-bb6b-4b915835e2f5" providerId="ADAL" clId="{7C04AEC6-2388-A444-8AD9-FEC97B542476}" dt="2023-11-08T10:18:39.639" v="50" actId="1036"/>
       <pc:docMkLst>
         <pc:docMk/>
       </pc:docMkLst>
       <pc:sldChg chg="modSp mod">
-        <pc:chgData name="Cecilia Trivellin" userId="77962b75-de7c-4c40-bb6b-4b915835e2f5" providerId="ADAL" clId="{50578758-FB8E-1D46-933B-BCB98BFCC5BC}" dt="2023-09-17T11:52:25.860" v="0" actId="1076"/>
+        <pc:chgData name="Cecilia Trivellin" userId="77962b75-de7c-4c40-bb6b-4b915835e2f5" providerId="ADAL" clId="{7C04AEC6-2388-A444-8AD9-FEC97B542476}" dt="2023-11-08T10:18:39.639" v="50" actId="1036"/>
         <pc:sldMkLst>
           <pc:docMk/>
           <pc:sldMk cId="1624886000" sldId="256"/>
         </pc:sldMkLst>
-        <pc:picChg chg="mod">
-          <ac:chgData name="Cecilia Trivellin" userId="77962b75-de7c-4c40-bb6b-4b915835e2f5" providerId="ADAL" clId="{50578758-FB8E-1D46-933B-BCB98BFCC5BC}" dt="2023-09-17T11:52:25.860" v="0" actId="1076"/>
+        <pc:spChg chg="mod">
+          <ac:chgData name="Cecilia Trivellin" userId="77962b75-de7c-4c40-bb6b-4b915835e2f5" providerId="ADAL" clId="{7C04AEC6-2388-A444-8AD9-FEC97B542476}" dt="2023-11-08T10:18:39.639" v="50" actId="1036"/>
+          <ac:spMkLst>
+            <pc:docMk/>
+            <pc:sldMk cId="1624886000" sldId="256"/>
+            <ac:spMk id="2" creationId="{03E5AD8B-604B-B558-0BA8-648EE232FE00}"/>
+          </ac:spMkLst>
+        </pc:spChg>
+        <pc:spChg chg="mod">
+          <ac:chgData name="Cecilia Trivellin" userId="77962b75-de7c-4c40-bb6b-4b915835e2f5" providerId="ADAL" clId="{7C04AEC6-2388-A444-8AD9-FEC97B542476}" dt="2023-11-08T10:18:39.639" v="50" actId="1036"/>
+          <ac:spMkLst>
+            <pc:docMk/>
+            <pc:sldMk cId="1624886000" sldId="256"/>
+            <ac:spMk id="3" creationId="{DB4CCBA4-08C6-309B-74A9-A214B8C9E9F6}"/>
+          </ac:spMkLst>
+        </pc:spChg>
+        <pc:spChg chg="mod">
+          <ac:chgData name="Cecilia Trivellin" userId="77962b75-de7c-4c40-bb6b-4b915835e2f5" providerId="ADAL" clId="{7C04AEC6-2388-A444-8AD9-FEC97B542476}" dt="2023-11-08T10:18:39.639" v="50" actId="1036"/>
+          <ac:spMkLst>
+            <pc:docMk/>
+            <pc:sldMk cId="1624886000" sldId="256"/>
+            <ac:spMk id="4" creationId="{BB50A536-EBA4-3457-1643-8966F16134BF}"/>
+          </ac:spMkLst>
+        </pc:spChg>
+        <pc:spChg chg="mod">
+          <ac:chgData name="Cecilia Trivellin" userId="77962b75-de7c-4c40-bb6b-4b915835e2f5" providerId="ADAL" clId="{7C04AEC6-2388-A444-8AD9-FEC97B542476}" dt="2023-11-08T10:18:39.639" v="50" actId="1036"/>
+          <ac:spMkLst>
+            <pc:docMk/>
+            <pc:sldMk cId="1624886000" sldId="256"/>
+            <ac:spMk id="5" creationId="{0ED6DDE6-634A-B98F-33B7-52785A8D03E7}"/>
+          </ac:spMkLst>
+        </pc:spChg>
+        <pc:spChg chg="mod">
+          <ac:chgData name="Cecilia Trivellin" userId="77962b75-de7c-4c40-bb6b-4b915835e2f5" providerId="ADAL" clId="{7C04AEC6-2388-A444-8AD9-FEC97B542476}" dt="2023-11-08T10:18:39.639" v="50" actId="1036"/>
+          <ac:spMkLst>
+            <pc:docMk/>
+            <pc:sldMk cId="1624886000" sldId="256"/>
+            <ac:spMk id="6" creationId="{8196FA3F-ABA6-A9E3-694B-D3DFA79AD09F}"/>
+          </ac:spMkLst>
+        </pc:spChg>
+        <pc:spChg chg="mod">
+          <ac:chgData name="Cecilia Trivellin" userId="77962b75-de7c-4c40-bb6b-4b915835e2f5" providerId="ADAL" clId="{7C04AEC6-2388-A444-8AD9-FEC97B542476}" dt="2023-11-08T10:18:39.639" v="50" actId="1036"/>
+          <ac:spMkLst>
+            <pc:docMk/>
+            <pc:sldMk cId="1624886000" sldId="256"/>
+            <ac:spMk id="7" creationId="{C34835CC-2E00-B4A9-D13A-C88077803E0C}"/>
+          </ac:spMkLst>
+        </pc:spChg>
+        <pc:spChg chg="mod">
+          <ac:chgData name="Cecilia Trivellin" userId="77962b75-de7c-4c40-bb6b-4b915835e2f5" providerId="ADAL" clId="{7C04AEC6-2388-A444-8AD9-FEC97B542476}" dt="2023-11-08T10:18:39.639" v="50" actId="1036"/>
+          <ac:spMkLst>
+            <pc:docMk/>
+            <pc:sldMk cId="1624886000" sldId="256"/>
+            <ac:spMk id="10" creationId="{5FA62518-2F8B-F021-F927-66D40C11453D}"/>
+          </ac:spMkLst>
+        </pc:spChg>
+        <pc:spChg chg="mod">
+          <ac:chgData name="Cecilia Trivellin" userId="77962b75-de7c-4c40-bb6b-4b915835e2f5" providerId="ADAL" clId="{7C04AEC6-2388-A444-8AD9-FEC97B542476}" dt="2023-11-08T10:18:39.639" v="50" actId="1036"/>
+          <ac:spMkLst>
+            <pc:docMk/>
+            <pc:sldMk cId="1624886000" sldId="256"/>
+            <ac:spMk id="14" creationId="{5D9402B8-F08E-CD4D-AE1D-966B7A6E045C}"/>
+          </ac:spMkLst>
+        </pc:spChg>
+        <pc:spChg chg="mod">
+          <ac:chgData name="Cecilia Trivellin" userId="77962b75-de7c-4c40-bb6b-4b915835e2f5" providerId="ADAL" clId="{7C04AEC6-2388-A444-8AD9-FEC97B542476}" dt="2023-11-08T10:18:19.927" v="39" actId="1036"/>
+          <ac:spMkLst>
+            <pc:docMk/>
+            <pc:sldMk cId="1624886000" sldId="256"/>
+            <ac:spMk id="18" creationId="{D8737C7D-E564-CCA9-B4D4-BD659C37BF36}"/>
+          </ac:spMkLst>
+        </pc:spChg>
+        <pc:spChg chg="mod">
+          <ac:chgData name="Cecilia Trivellin" userId="77962b75-de7c-4c40-bb6b-4b915835e2f5" providerId="ADAL" clId="{7C04AEC6-2388-A444-8AD9-FEC97B542476}" dt="2023-11-08T10:18:24.617" v="42" actId="1035"/>
+          <ac:spMkLst>
+            <pc:docMk/>
+            <pc:sldMk cId="1624886000" sldId="256"/>
+            <ac:spMk id="19" creationId="{761C9B9D-5939-44D6-C1D4-8F0786A28CC4}"/>
+          </ac:spMkLst>
+        </pc:spChg>
+        <pc:spChg chg="mod">
+          <ac:chgData name="Cecilia Trivellin" userId="77962b75-de7c-4c40-bb6b-4b915835e2f5" providerId="ADAL" clId="{7C04AEC6-2388-A444-8AD9-FEC97B542476}" dt="2023-11-08T10:18:39.639" v="50" actId="1036"/>
+          <ac:spMkLst>
+            <pc:docMk/>
+            <pc:sldMk cId="1624886000" sldId="256"/>
+            <ac:spMk id="22" creationId="{9A2B20AA-DCB6-BFDF-2BD9-2A59E3AA0363}"/>
+          </ac:spMkLst>
+        </pc:spChg>
+        <pc:spChg chg="mod">
+          <ac:chgData name="Cecilia Trivellin" userId="77962b75-de7c-4c40-bb6b-4b915835e2f5" providerId="ADAL" clId="{7C04AEC6-2388-A444-8AD9-FEC97B542476}" dt="2023-11-08T10:18:39.639" v="50" actId="1036"/>
+          <ac:spMkLst>
+            <pc:docMk/>
+            <pc:sldMk cId="1624886000" sldId="256"/>
+            <ac:spMk id="23" creationId="{55C96A3D-FBC5-F10B-3AA7-4D5A897E4A32}"/>
+          </ac:spMkLst>
+        </pc:spChg>
+        <pc:picChg chg="mod modCrop">
+          <ac:chgData name="Cecilia Trivellin" userId="77962b75-de7c-4c40-bb6b-4b915835e2f5" providerId="ADAL" clId="{7C04AEC6-2388-A444-8AD9-FEC97B542476}" dt="2023-11-08T10:18:03.076" v="20" actId="1036"/>
           <ac:picMkLst>
             <pc:docMk/>
             <pc:sldMk cId="1624886000" sldId="256"/>
             <ac:picMk id="9" creationId="{68954042-0BD1-1A76-53ED-46D24327A855}"/>
           </ac:picMkLst>
         </pc:picChg>
+        <pc:cxnChg chg="mod">
+          <ac:chgData name="Cecilia Trivellin" userId="77962b75-de7c-4c40-bb6b-4b915835e2f5" providerId="ADAL" clId="{7C04AEC6-2388-A444-8AD9-FEC97B542476}" dt="2023-11-08T10:18:09.153" v="28" actId="1036"/>
+          <ac:cxnSpMkLst>
+            <pc:docMk/>
+            <pc:sldMk cId="1624886000" sldId="256"/>
+            <ac:cxnSpMk id="21" creationId="{A59957B7-4388-2292-5C1B-8C82A66E1358}"/>
+          </ac:cxnSpMkLst>
+        </pc:cxnChg>
       </pc:sldChg>
     </pc:docChg>
   </pc:docChgLst>
@@ -1050,6 +1152,30 @@
         </pc:spChg>
         <pc:picChg chg="mod">
           <ac:chgData name="Cecilia Trivellin" userId="77962b75-de7c-4c40-bb6b-4b915835e2f5" providerId="ADAL" clId="{13BEA3D3-992D-B74D-9D95-C1B6D17AF580}" dt="2023-09-17T11:57:05.854" v="0" actId="14826"/>
+          <ac:picMkLst>
+            <pc:docMk/>
+            <pc:sldMk cId="1624886000" sldId="256"/>
+            <ac:picMk id="9" creationId="{68954042-0BD1-1A76-53ED-46D24327A855}"/>
+          </ac:picMkLst>
+        </pc:picChg>
+      </pc:sldChg>
+    </pc:docChg>
+  </pc:docChgLst>
+  <pc:docChgLst>
+    <pc:chgData name="Cecilia Trivellin" userId="77962b75-de7c-4c40-bb6b-4b915835e2f5" providerId="ADAL" clId="{50578758-FB8E-1D46-933B-BCB98BFCC5BC}"/>
+    <pc:docChg chg="modSld">
+      <pc:chgData name="Cecilia Trivellin" userId="77962b75-de7c-4c40-bb6b-4b915835e2f5" providerId="ADAL" clId="{50578758-FB8E-1D46-933B-BCB98BFCC5BC}" dt="2023-09-17T11:52:25.860" v="0" actId="1076"/>
+      <pc:docMkLst>
+        <pc:docMk/>
+      </pc:docMkLst>
+      <pc:sldChg chg="modSp mod">
+        <pc:chgData name="Cecilia Trivellin" userId="77962b75-de7c-4c40-bb6b-4b915835e2f5" providerId="ADAL" clId="{50578758-FB8E-1D46-933B-BCB98BFCC5BC}" dt="2023-09-17T11:52:25.860" v="0" actId="1076"/>
+        <pc:sldMkLst>
+          <pc:docMk/>
+          <pc:sldMk cId="1624886000" sldId="256"/>
+        </pc:sldMkLst>
+        <pc:picChg chg="mod">
+          <ac:chgData name="Cecilia Trivellin" userId="77962b75-de7c-4c40-bb6b-4b915835e2f5" providerId="ADAL" clId="{50578758-FB8E-1D46-933B-BCB98BFCC5BC}" dt="2023-09-17T11:52:25.860" v="0" actId="1076"/>
           <ac:picMkLst>
             <pc:docMk/>
             <pc:sldMk cId="1624886000" sldId="256"/>
@@ -1144,7 +1270,7 @@
           <a:p>
             <a:fld id="{97096B5B-EE8E-F04D-A7C1-5760DFD9A756}" type="datetimeFigureOut">
               <a:rPr lang="en-US" smtClean="0"/>
-              <a:t>9/17/23</a:t>
+              <a:t>11/8/23</a:t>
             </a:fld>
             <a:endParaRPr lang="en-US"/>
           </a:p>
@@ -1631,7 +1757,7 @@
           <a:p>
             <a:fld id="{BB4388B5-74DE-BA45-9FD7-F6D5BDF0B5A1}" type="datetimeFigureOut">
               <a:rPr lang="en-US" smtClean="0"/>
-              <a:t>9/17/23</a:t>
+              <a:t>11/8/23</a:t>
             </a:fld>
             <a:endParaRPr lang="en-US"/>
           </a:p>
@@ -1801,7 +1927,7 @@
           <a:p>
             <a:fld id="{BB4388B5-74DE-BA45-9FD7-F6D5BDF0B5A1}" type="datetimeFigureOut">
               <a:rPr lang="en-US" smtClean="0"/>
-              <a:t>9/17/23</a:t>
+              <a:t>11/8/23</a:t>
             </a:fld>
             <a:endParaRPr lang="en-US"/>
           </a:p>
@@ -1981,7 +2107,7 @@
           <a:p>
             <a:fld id="{BB4388B5-74DE-BA45-9FD7-F6D5BDF0B5A1}" type="datetimeFigureOut">
               <a:rPr lang="en-US" smtClean="0"/>
-              <a:t>9/17/23</a:t>
+              <a:t>11/8/23</a:t>
             </a:fld>
             <a:endParaRPr lang="en-US"/>
           </a:p>
@@ -2151,7 +2277,7 @@
           <a:p>
             <a:fld id="{BB4388B5-74DE-BA45-9FD7-F6D5BDF0B5A1}" type="datetimeFigureOut">
               <a:rPr lang="en-US" smtClean="0"/>
-              <a:t>9/17/23</a:t>
+              <a:t>11/8/23</a:t>
             </a:fld>
             <a:endParaRPr lang="en-US"/>
           </a:p>
@@ -2397,7 +2523,7 @@
           <a:p>
             <a:fld id="{BB4388B5-74DE-BA45-9FD7-F6D5BDF0B5A1}" type="datetimeFigureOut">
               <a:rPr lang="en-US" smtClean="0"/>
-              <a:t>9/17/23</a:t>
+              <a:t>11/8/23</a:t>
             </a:fld>
             <a:endParaRPr lang="en-US"/>
           </a:p>
@@ -2629,7 +2755,7 @@
           <a:p>
             <a:fld id="{BB4388B5-74DE-BA45-9FD7-F6D5BDF0B5A1}" type="datetimeFigureOut">
               <a:rPr lang="en-US" smtClean="0"/>
-              <a:t>9/17/23</a:t>
+              <a:t>11/8/23</a:t>
             </a:fld>
             <a:endParaRPr lang="en-US"/>
           </a:p>
@@ -2996,7 +3122,7 @@
           <a:p>
             <a:fld id="{BB4388B5-74DE-BA45-9FD7-F6D5BDF0B5A1}" type="datetimeFigureOut">
               <a:rPr lang="en-US" smtClean="0"/>
-              <a:t>9/17/23</a:t>
+              <a:t>11/8/23</a:t>
             </a:fld>
             <a:endParaRPr lang="en-US"/>
           </a:p>
@@ -3114,7 +3240,7 @@
           <a:p>
             <a:fld id="{BB4388B5-74DE-BA45-9FD7-F6D5BDF0B5A1}" type="datetimeFigureOut">
               <a:rPr lang="en-US" smtClean="0"/>
-              <a:t>9/17/23</a:t>
+              <a:t>11/8/23</a:t>
             </a:fld>
             <a:endParaRPr lang="en-US"/>
           </a:p>
@@ -3209,7 +3335,7 @@
           <a:p>
             <a:fld id="{BB4388B5-74DE-BA45-9FD7-F6D5BDF0B5A1}" type="datetimeFigureOut">
               <a:rPr lang="en-US" smtClean="0"/>
-              <a:t>9/17/23</a:t>
+              <a:t>11/8/23</a:t>
             </a:fld>
             <a:endParaRPr lang="en-US"/>
           </a:p>
@@ -3486,7 +3612,7 @@
           <a:p>
             <a:fld id="{BB4388B5-74DE-BA45-9FD7-F6D5BDF0B5A1}" type="datetimeFigureOut">
               <a:rPr lang="en-US" smtClean="0"/>
-              <a:t>9/17/23</a:t>
+              <a:t>11/8/23</a:t>
             </a:fld>
             <a:endParaRPr lang="en-US"/>
           </a:p>
@@ -3743,7 +3869,7 @@
           <a:p>
             <a:fld id="{BB4388B5-74DE-BA45-9FD7-F6D5BDF0B5A1}" type="datetimeFigureOut">
               <a:rPr lang="en-US" smtClean="0"/>
-              <a:t>9/17/23</a:t>
+              <a:t>11/8/23</a:t>
             </a:fld>
             <a:endParaRPr lang="en-US"/>
           </a:p>
@@ -3956,7 +4082,7 @@
           <a:p>
             <a:fld id="{BB4388B5-74DE-BA45-9FD7-F6D5BDF0B5A1}" type="datetimeFigureOut">
               <a:rPr lang="en-US" smtClean="0"/>
-              <a:t>9/17/23</a:t>
+              <a:t>11/8/23</a:t>
             </a:fld>
             <a:endParaRPr lang="en-US"/>
           </a:p>
@@ -4375,15 +4501,15 @@
           </p:cNvPicPr>
           <p:nvPr/>
         </p:nvPicPr>
-        <p:blipFill>
+        <p:blipFill rotWithShape="1">
           <a:blip r:embed="rId3"/>
-          <a:srcRect/>
+          <a:srcRect b="1853"/>
           <a:stretch/>
         </p:blipFill>
         <p:spPr>
           <a:xfrm>
-            <a:off x="704359" y="19170"/>
-            <a:ext cx="8230317" cy="5486878"/>
+            <a:off x="704359" y="77785"/>
+            <a:ext cx="8230317" cy="5385164"/>
           </a:xfrm>
           <a:prstGeom prst="rect">
             <a:avLst/>
@@ -4404,7 +4530,7 @@
         </p:nvSpPr>
         <p:spPr>
           <a:xfrm>
-            <a:off x="9108674" y="2025621"/>
+            <a:off x="9073505" y="2037344"/>
             <a:ext cx="191203" cy="205177"/>
           </a:xfrm>
           <a:prstGeom prst="rect">
@@ -4453,7 +4579,7 @@
         </p:nvSpPr>
         <p:spPr>
           <a:xfrm>
-            <a:off x="9299877" y="1657120"/>
+            <a:off x="9264708" y="1668843"/>
             <a:ext cx="985241" cy="307777"/>
           </a:xfrm>
           <a:prstGeom prst="rect">
@@ -4491,7 +4617,7 @@
         </p:nvSpPr>
         <p:spPr>
           <a:xfrm rot="16200000">
-            <a:off x="-734582" y="869239"/>
+            <a:off x="-734582" y="834070"/>
             <a:ext cx="1943196" cy="307777"/>
           </a:xfrm>
           <a:prstGeom prst="rect">
@@ -4529,7 +4655,7 @@
         </p:nvSpPr>
         <p:spPr>
           <a:xfrm rot="16200000">
-            <a:off x="-860908" y="3069570"/>
+            <a:off x="-860908" y="2940617"/>
             <a:ext cx="2195848" cy="307777"/>
           </a:xfrm>
           <a:prstGeom prst="rect">
@@ -4567,7 +4693,7 @@
         </p:nvCxnSpPr>
         <p:spPr>
           <a:xfrm>
-            <a:off x="13404" y="2153321"/>
+            <a:off x="13404" y="2082983"/>
             <a:ext cx="447229" cy="0"/>
           </a:xfrm>
           <a:prstGeom prst="line">
@@ -4608,7 +4734,7 @@
         </p:nvSpPr>
         <p:spPr>
           <a:xfrm>
-            <a:off x="9037649" y="1329535"/>
+            <a:off x="9002480" y="1341258"/>
             <a:ext cx="1295516" cy="307777"/>
           </a:xfrm>
           <a:prstGeom prst="rect">
@@ -4646,7 +4772,7 @@
         </p:nvSpPr>
         <p:spPr>
           <a:xfrm>
-            <a:off x="8996086" y="541979"/>
+            <a:off x="8960917" y="553702"/>
             <a:ext cx="2142608" cy="738664"/>
           </a:xfrm>
           <a:prstGeom prst="rect">
@@ -4693,7 +4819,7 @@
         </p:nvSpPr>
         <p:spPr>
           <a:xfrm>
-            <a:off x="9108674" y="2342821"/>
+            <a:off x="9073505" y="2354544"/>
             <a:ext cx="191203" cy="205177"/>
           </a:xfrm>
           <a:prstGeom prst="rect">
@@ -4742,7 +4868,7 @@
         </p:nvSpPr>
         <p:spPr>
           <a:xfrm>
-            <a:off x="9108674" y="2660021"/>
+            <a:off x="9073505" y="2671744"/>
             <a:ext cx="191203" cy="205177"/>
           </a:xfrm>
           <a:prstGeom prst="rect">
@@ -4791,7 +4917,7 @@
         </p:nvSpPr>
         <p:spPr>
           <a:xfrm>
-            <a:off x="9108674" y="1708421"/>
+            <a:off x="9073505" y="1720144"/>
             <a:ext cx="191203" cy="205177"/>
           </a:xfrm>
           <a:prstGeom prst="rect">
@@ -4840,7 +4966,7 @@
         </p:nvSpPr>
         <p:spPr>
           <a:xfrm>
-            <a:off x="9299877" y="1979187"/>
+            <a:off x="9264708" y="1990910"/>
             <a:ext cx="985241" cy="307777"/>
           </a:xfrm>
           <a:prstGeom prst="rect">
@@ -4878,7 +5004,7 @@
         </p:nvSpPr>
         <p:spPr>
           <a:xfrm>
-            <a:off x="9299877" y="2284685"/>
+            <a:off x="9264708" y="2296408"/>
             <a:ext cx="985241" cy="307777"/>
           </a:xfrm>
           <a:prstGeom prst="rect">
@@ -4916,7 +5042,7 @@
         </p:nvSpPr>
         <p:spPr>
           <a:xfrm>
-            <a:off x="9299877" y="2628372"/>
+            <a:off x="9264708" y="2640095"/>
             <a:ext cx="985241" cy="307777"/>
           </a:xfrm>
           <a:prstGeom prst="rect">

</xml_diff>